<commit_message>
Edited link on last page
</commit_message>
<xml_diff>
--- a/Slides/Stone USB - Std.pptx
+++ b/Slides/Stone USB - Std.pptx
@@ -4918,24 +4918,29 @@
             <a:pPr marL="0" indent="0" algn="ctr">
               <a:buNone/>
             </a:pPr>
-            <a:endParaRPr lang="en-US" u="sng" dirty="0">
-              <a:hlinkClick r:id="rId3"/>
-            </a:endParaRPr>
+            <a:endParaRPr lang="en-US" u="sng" dirty="0"/>
           </a:p>
           <a:p>
             <a:pPr marL="0" indent="0" algn="ctr">
               <a:buNone/>
             </a:pPr>
             <a:r>
-              <a:rPr lang="en-US" u="sng" dirty="0">
+              <a:rPr lang="en-US" sz="4000" u="sng" dirty="0">
                 <a:solidFill>
                   <a:schemeClr val="accent4"/>
                 </a:solidFill>
-                <a:hlinkClick r:id="rId3"/>
               </a:rPr>
-              <a:t>https://library.waikato.ac.nz/usb/tict-USB.zip</a:t>
-            </a:r>
-            <a:endParaRPr lang="en-US" u="sng" dirty="0">
+              <a:t>https://</a:t>
+            </a:r>
+            <a:r>
+              <a:rPr lang="en-US" sz="4000" u="sng" dirty="0" smtClean="0">
+                <a:solidFill>
+                  <a:schemeClr val="accent4"/>
+                </a:solidFill>
+              </a:rPr>
+              <a:t>library.waikato.ac.nz/usb</a:t>
+            </a:r>
+            <a:endParaRPr lang="en-US" sz="4000" u="sng" dirty="0">
               <a:solidFill>
                 <a:schemeClr val="accent4"/>
               </a:solidFill>
@@ -5352,7 +5357,6 @@
               <a:rPr lang="en-NZ" dirty="0"/>
               <a:t> (in bytes) Returns different values for different versions of Windows!</a:t>
             </a:r>
-            <a:endParaRPr lang="en-NZ" dirty="0"/>
           </a:p>
         </p:txBody>
       </p:sp>
@@ -5463,7 +5467,6 @@
               <a:rPr lang="en-NZ" dirty="0"/>
               <a:t>Script interacts with a web API written in PHP that performs the interaction with the Database.</a:t>
             </a:r>
-            <a:endParaRPr lang="en-NZ" dirty="0"/>
           </a:p>
         </p:txBody>
       </p:sp>
@@ -5589,7 +5592,6 @@
               <a:rPr lang="en-NZ" dirty="0"/>
               <a:t>. date and time, is recorded in the local file AND sent via API to the database</a:t>
             </a:r>
-            <a:endParaRPr lang="en-NZ" dirty="0"/>
           </a:p>
         </p:txBody>
       </p:sp>

</xml_diff>

<commit_message>
Added acknowledgement to last slide
Acknowledgement
Library Systems Developer, Fred Young, provided significant feedback and contributed improvements to the look and “feel” of the USB API.
</commit_message>
<xml_diff>
--- a/Slides/Stone USB - Std.pptx
+++ b/Slides/Stone USB - Std.pptx
@@ -215,7 +215,7 @@
           <a:p>
             <a:fld id="{20EA1060-EC34-4B21-B2CA-AE568AF2EAA1}" type="datetimeFigureOut">
               <a:rPr lang="en-NZ" smtClean="0"/>
-              <a:t>31/08/2017</a:t>
+              <a:t>1/09/2017</a:t>
             </a:fld>
             <a:endParaRPr lang="en-NZ"/>
           </a:p>
@@ -380,7 +380,7 @@
           <a:p>
             <a:fld id="{2BF5C513-E85A-40A7-AFD0-35FEFA73FC32}" type="datetimeFigureOut">
               <a:rPr lang="en-NZ" smtClean="0"/>
-              <a:t>31/08/2017</a:t>
+              <a:t>1/09/2017</a:t>
             </a:fld>
             <a:endParaRPr lang="en-NZ"/>
           </a:p>
@@ -4900,9 +4900,16 @@
             <p:ph idx="1"/>
           </p:nvPr>
         </p:nvSpPr>
-        <p:spPr/>
-        <p:txBody>
-          <a:bodyPr/>
+        <p:spPr>
+          <a:xfrm>
+            <a:off x="446943" y="1460498"/>
+            <a:ext cx="7886700" cy="4608607"/>
+          </a:xfrm>
+        </p:spPr>
+        <p:txBody>
+          <a:bodyPr>
+            <a:normAutofit/>
+          </a:bodyPr>
           <a:lstStyle/>
           <a:p>
             <a:pPr marL="0" indent="0">
@@ -4910,7 +4917,20 @@
             </a:pPr>
             <a:r>
               <a:rPr lang="en-US" dirty="0"/>
-              <a:t>A zip file containing source code and instructions relative to both process is available at:</a:t>
+              <a:t>Source code and instructions for both process are on </a:t>
+            </a:r>
+            <a:r>
+              <a:rPr lang="en-US" dirty="0">
+                <a:solidFill>
+                  <a:schemeClr val="accent4"/>
+                </a:solidFill>
+                <a:hlinkClick r:id="rId3"/>
+              </a:rPr>
+              <a:t>GitHub</a:t>
+            </a:r>
+            <a:r>
+              <a:rPr lang="en-US" dirty="0"/>
+              <a:t> and linked to from the API:</a:t>
             </a:r>
             <a:endParaRPr lang="en-NZ" dirty="0"/>
           </a:p>
@@ -4948,6 +4968,43 @@
           </a:p>
           <a:p>
             <a:endParaRPr lang="en-US" u="sng" dirty="0"/>
+          </a:p>
+          <a:p>
+            <a:pPr marL="0" indent="0">
+              <a:buNone/>
+            </a:pPr>
+            <a:endParaRPr lang="en-US" sz="1600" b="1" dirty="0" smtClean="0"/>
+          </a:p>
+          <a:p>
+            <a:pPr marL="0" indent="0">
+              <a:buNone/>
+            </a:pPr>
+            <a:endParaRPr lang="en-US" sz="1600" b="1" dirty="0" smtClean="0"/>
+          </a:p>
+          <a:p>
+            <a:pPr marL="0" indent="0">
+              <a:buNone/>
+            </a:pPr>
+            <a:endParaRPr lang="en-US" sz="1600" b="1" dirty="0"/>
+          </a:p>
+          <a:p>
+            <a:pPr marL="0" indent="0">
+              <a:buNone/>
+            </a:pPr>
+            <a:r>
+              <a:rPr lang="en-US" sz="1600" b="1" dirty="0" smtClean="0"/>
+              <a:t>Acknowledgement</a:t>
+            </a:r>
+            <a:endParaRPr lang="en-US" sz="1600" b="1" dirty="0"/>
+          </a:p>
+          <a:p>
+            <a:pPr marL="0" indent="0">
+              <a:buNone/>
+            </a:pPr>
+            <a:r>
+              <a:rPr lang="en-US" sz="1600" dirty="0"/>
+              <a:t>Library Systems Developer, Fred Young, provided significant feedback and contributed improvements to the look and “feel” of the USB API. </a:t>
+            </a:r>
           </a:p>
           <a:p>
             <a:endParaRPr lang="en-NZ" dirty="0"/>

</xml_diff>

<commit_message>
Adjusted Acknowledgement on last slide
</commit_message>
<xml_diff>
--- a/Slides/Stone USB - Std.pptx
+++ b/Slides/Stone USB - Std.pptx
@@ -215,7 +215,7 @@
           <a:p>
             <a:fld id="{20EA1060-EC34-4B21-B2CA-AE568AF2EAA1}" type="datetimeFigureOut">
               <a:rPr lang="en-NZ" smtClean="0"/>
-              <a:t>1/09/2017</a:t>
+              <a:t>4/09/2017</a:t>
             </a:fld>
             <a:endParaRPr lang="en-NZ"/>
           </a:p>
@@ -380,7 +380,7 @@
           <a:p>
             <a:fld id="{2BF5C513-E85A-40A7-AFD0-35FEFA73FC32}" type="datetimeFigureOut">
               <a:rPr lang="en-NZ" smtClean="0"/>
-              <a:t>1/09/2017</a:t>
+              <a:t>4/09/2017</a:t>
             </a:fld>
             <a:endParaRPr lang="en-NZ"/>
           </a:p>
@@ -5003,7 +5003,19 @@
             </a:pPr>
             <a:r>
               <a:rPr lang="en-US" sz="1600" dirty="0"/>
-              <a:t>Library Systems Developer, Fred Young, provided significant feedback and contributed improvements to the look and “feel” of the USB API. </a:t>
+              <a:t>Library Systems Developer, Fred </a:t>
+            </a:r>
+            <a:r>
+              <a:rPr lang="en-US" sz="1600" dirty="0" smtClean="0"/>
+              <a:t>Young who preformed peer review </a:t>
+            </a:r>
+            <a:r>
+              <a:rPr lang="en-US" sz="1600" smtClean="0"/>
+              <a:t>and contributed </a:t>
+            </a:r>
+            <a:r>
+              <a:rPr lang="en-US" sz="1600" dirty="0"/>
+              <a:t>improvements to the look and “feel” of the USB API. </a:t>
             </a:r>
           </a:p>
           <a:p>

</xml_diff>

<commit_message>
Adjusted mediatype on 4th slide
</commit_message>
<xml_diff>
--- a/Slides/Stone USB - Std.pptx
+++ b/Slides/Stone USB - Std.pptx
@@ -4979,12 +4979,16 @@
             <a:pPr marL="0" indent="0">
               <a:buNone/>
             </a:pPr>
-            <a:endParaRPr lang="en-US" sz="1600" b="1" dirty="0" smtClean="0"/>
+            <a:endParaRPr lang="en-US" sz="1600" b="1" dirty="0"/>
           </a:p>
           <a:p>
             <a:pPr marL="0" indent="0">
               <a:buNone/>
             </a:pPr>
+            <a:r>
+              <a:rPr lang="en-US" sz="1600" b="1" dirty="0" smtClean="0"/>
+              <a:t>Acknowledgement</a:t>
+            </a:r>
             <a:endParaRPr lang="en-US" sz="1600" b="1" dirty="0"/>
           </a:p>
           <a:p>
@@ -4992,31 +4996,10 @@
               <a:buNone/>
             </a:pPr>
             <a:r>
-              <a:rPr lang="en-US" sz="1600" b="1" dirty="0" smtClean="0"/>
-              <a:t>Acknowledgement</a:t>
-            </a:r>
-            <a:endParaRPr lang="en-US" sz="1600" b="1" dirty="0"/>
-          </a:p>
-          <a:p>
-            <a:pPr marL="0" indent="0">
-              <a:buNone/>
-            </a:pPr>
-            <a:r>
               <a:rPr lang="en-US" sz="1600" dirty="0"/>
-              <a:t>Library Systems Developer, Fred </a:t>
-            </a:r>
-            <a:r>
-              <a:rPr lang="en-US" sz="1600" dirty="0" smtClean="0"/>
-              <a:t>Young who preformed peer review </a:t>
-            </a:r>
-            <a:r>
-              <a:rPr lang="en-US" sz="1600" smtClean="0"/>
-              <a:t>and contributed </a:t>
-            </a:r>
-            <a:r>
-              <a:rPr lang="en-US" sz="1600" dirty="0"/>
-              <a:t>improvements to the look and “feel” of the USB API. </a:t>
-            </a:r>
+              <a:t>Library Systems Developer, Fred Young who peer reviewed, contributing improvement to the database structure, file distribution and the look and “feel” of the USB API. </a:t>
+            </a:r>
+            <a:endParaRPr lang="en-US" sz="1600" dirty="0"/>
           </a:p>
           <a:p>
             <a:endParaRPr lang="en-NZ" dirty="0"/>
@@ -5409,13 +5392,40 @@
           </a:p>
           <a:p>
             <a:r>
-              <a:rPr lang="en-NZ" b="1" dirty="0" err="1"/>
+              <a:rPr lang="en-NZ" b="1" dirty="0" err="1">
+                <a:solidFill>
+                  <a:schemeClr val="bg1">
+                    <a:lumMod val="75000"/>
+                  </a:schemeClr>
+                </a:solidFill>
+              </a:rPr>
               <a:t>MediaType</a:t>
             </a:r>
             <a:r>
-              <a:rPr lang="en-NZ" dirty="0"/>
-              <a:t> is always “Removable Media”</a:t>
-            </a:r>
+              <a:rPr lang="en-NZ" dirty="0">
+                <a:solidFill>
+                  <a:schemeClr val="bg1">
+                    <a:lumMod val="75000"/>
+                  </a:schemeClr>
+                </a:solidFill>
+              </a:rPr>
+              <a:t> is always “Removable Media</a:t>
+            </a:r>
+            <a:r>
+              <a:rPr lang="en-NZ" dirty="0" smtClean="0">
+                <a:solidFill>
+                  <a:schemeClr val="bg1">
+                    <a:lumMod val="75000"/>
+                  </a:schemeClr>
+                </a:solidFill>
+              </a:rPr>
+              <a:t>” </a:t>
+            </a:r>
+            <a:r>
+              <a:rPr lang="en-NZ" dirty="0" smtClean="0"/>
+              <a:t>(so is not being used)</a:t>
+            </a:r>
+            <a:endParaRPr lang="en-NZ" dirty="0"/>
           </a:p>
           <a:p>
             <a:r>
@@ -5654,13 +5664,26 @@
               <a:t>If the device was not previously recorded on the PC, then the USB metadata together with the username, </a:t>
             </a:r>
             <a:r>
-              <a:rPr lang="en-NZ" dirty="0" err="1"/>
+              <a:rPr lang="en-NZ" dirty="0" err="1" smtClean="0"/>
               <a:t>computername</a:t>
             </a:r>
             <a:r>
               <a:rPr lang="en-NZ" dirty="0"/>
-              <a:t>. date and time, is recorded in the local file AND sent via API to the database</a:t>
-            </a:r>
+              <a:t>,</a:t>
+            </a:r>
+            <a:r>
+              <a:rPr lang="en-NZ" dirty="0" smtClean="0"/>
+              <a:t> </a:t>
+            </a:r>
+            <a:r>
+              <a:rPr lang="en-NZ" dirty="0"/>
+              <a:t>date and time, is recorded in the local file AND sent via API to the </a:t>
+            </a:r>
+            <a:r>
+              <a:rPr lang="en-NZ" dirty="0" smtClean="0"/>
+              <a:t>database.</a:t>
+            </a:r>
+            <a:endParaRPr lang="en-NZ" dirty="0"/>
           </a:p>
         </p:txBody>
       </p:sp>
@@ -5744,7 +5767,15 @@
           <a:p>
             <a:r>
               <a:rPr lang="en-NZ" dirty="0"/>
-              <a:t>Typically staff will plug in the USB and run the script from a shortcut which calls PowerShell explicitly with two arguments: The first argument is the path to the script itself and the second argument is anything you want - say a "X" </a:t>
+              <a:t>Typically staff will plug in the USB and run the script from a shortcut which calls PowerShell explicitly with two arguments: The first argument is the path to the script itself and the second argument is anything you want - say a </a:t>
+            </a:r>
+            <a:r>
+              <a:rPr lang="en-NZ" dirty="0" smtClean="0"/>
+              <a:t>“x"</a:t>
+            </a:r>
+            <a:r>
+              <a:rPr lang="en-NZ" dirty="0"/>
+              <a:t> </a:t>
             </a:r>
           </a:p>
           <a:p>
@@ -5945,14 +5976,14 @@
           <a:p>
             <a:r>
               <a:rPr lang="en-US" dirty="0"/>
-              <a:t>Single table MySQL or </a:t>
-            </a:r>
-            <a:r>
-              <a:rPr lang="en-US" b="1" dirty="0" err="1"/>
+              <a:t>Single table </a:t>
+            </a:r>
+            <a:r>
+              <a:rPr lang="en-US" b="1" dirty="0" err="1" smtClean="0"/>
               <a:t>MariaDB</a:t>
             </a:r>
             <a:r>
-              <a:rPr lang="en-US" dirty="0"/>
+              <a:rPr lang="en-US" dirty="0" smtClean="0"/>
               <a:t> </a:t>
             </a:r>
             <a:endParaRPr lang="en-NZ" dirty="0"/>

</xml_diff>